<commit_message>
Updated Presentation for class
</commit_message>
<xml_diff>
--- a/Class Presentation 10-30-2013/Presentation.pptx
+++ b/Class Presentation 10-30-2013/Presentation.pptx
@@ -8,10 +8,11 @@
     <p:sldId id="256" r:id="rId2"/>
     <p:sldId id="257" r:id="rId3"/>
     <p:sldId id="259" r:id="rId4"/>
-    <p:sldId id="258" r:id="rId5"/>
-    <p:sldId id="262" r:id="rId6"/>
-    <p:sldId id="260" r:id="rId7"/>
-    <p:sldId id="261" r:id="rId8"/>
+    <p:sldId id="263" r:id="rId5"/>
+    <p:sldId id="258" r:id="rId6"/>
+    <p:sldId id="262" r:id="rId7"/>
+    <p:sldId id="260" r:id="rId8"/>
+    <p:sldId id="261" r:id="rId9"/>
   </p:sldIdLst>
   <p:sldSz cx="9144000" cy="6858000" type="screen4x3"/>
   <p:notesSz cx="6858000" cy="9144000"/>
@@ -110,6 +111,22 @@
       </a:defRPr>
     </a:lvl9pPr>
   </p:defaultTextStyle>
+  <p:extLst>
+    <p:ext uri="{EFAFB233-063F-42B5-8137-9DF3F51BA10A}">
+      <p15:sldGuideLst xmlns:p15="http://schemas.microsoft.com/office/powerpoint/2012/main">
+        <p15:guide id="1" orient="horz" pos="2160">
+          <p15:clr>
+            <a:srgbClr val="A4A3A4"/>
+          </p15:clr>
+        </p15:guide>
+        <p15:guide id="2" pos="2880">
+          <p15:clr>
+            <a:srgbClr val="A4A3A4"/>
+          </p15:clr>
+        </p15:guide>
+      </p15:sldGuideLst>
+    </p:ext>
+  </p:extLst>
 </p:presentation>
 </file>
 
@@ -3886,19 +3903,36 @@
         </p:nvSpPr>
         <p:spPr/>
         <p:txBody>
-          <a:bodyPr/>
-          <a:lstStyle/>
-          <a:p>
-            <a:r>
-              <a:rPr lang="en-US" dirty="0" smtClean="0"/>
-              <a:t>Obtain a license for Simulink 3D Animation to begin simulation development</a:t>
-            </a:r>
-          </a:p>
-          <a:p>
-            <a:r>
-              <a:rPr lang="en-US" dirty="0" smtClean="0"/>
-              <a:t>Create custom 3D models for interior of vehicle and track</a:t>
-            </a:r>
+          <a:bodyPr>
+            <a:normAutofit/>
+          </a:bodyPr>
+          <a:lstStyle/>
+          <a:p>
+            <a:r>
+              <a:rPr lang="en-US" dirty="0" smtClean="0"/>
+              <a:t>Obtain a license for Simulink 3D </a:t>
+            </a:r>
+            <a:endParaRPr lang="en-US" dirty="0" smtClean="0"/>
+          </a:p>
+          <a:p>
+            <a:r>
+              <a:rPr lang="en-US" dirty="0" smtClean="0"/>
+              <a:t>Animation Work on 3D car/track design</a:t>
+            </a:r>
+          </a:p>
+          <a:p>
+            <a:r>
+              <a:rPr lang="en-US" dirty="0" smtClean="0"/>
+              <a:t>Map Steering-Wheel input (Simulink Joystick input)</a:t>
+            </a:r>
+            <a:endParaRPr lang="en-US" dirty="0" smtClean="0"/>
+          </a:p>
+          <a:p>
+            <a:r>
+              <a:rPr lang="en-US" dirty="0" smtClean="0"/>
+              <a:t>Create real-time data visualizations (graphs)</a:t>
+            </a:r>
+            <a:endParaRPr lang="en-US" dirty="0" smtClean="0"/>
           </a:p>
           <a:p>
             <a:r>
@@ -3906,12 +3940,12 @@
               <a:t>Map track position data to </a:t>
             </a:r>
             <a:r>
-              <a:rPr lang="en-US" dirty="0" err="1" smtClean="0"/>
-              <a:t>Matlab</a:t>
-            </a:r>
-            <a:r>
-              <a:rPr lang="en-US" dirty="0" smtClean="0"/>
-              <a:t>-readable dataset</a:t>
+              <a:rPr lang="en-US" dirty="0" smtClean="0"/>
+              <a:t>MATLAB-readable </a:t>
+            </a:r>
+            <a:r>
+              <a:rPr lang="en-US" dirty="0" smtClean="0"/>
+              <a:t>dataset</a:t>
             </a:r>
           </a:p>
         </p:txBody>
@@ -3963,7 +3997,11 @@
           <a:p>
             <a:r>
               <a:rPr lang="en-US" dirty="0" smtClean="0"/>
-              <a:t>Potential Issues</a:t>
+              <a:t>Design </a:t>
+            </a:r>
+            <a:r>
+              <a:rPr lang="en-US" dirty="0" smtClean="0"/>
+              <a:t>Tasks</a:t>
             </a:r>
             <a:endParaRPr lang="en-US" dirty="0"/>
           </a:p>
@@ -3988,63 +4026,71 @@
           <a:p>
             <a:r>
               <a:rPr lang="en-US" dirty="0" smtClean="0"/>
-              <a:t>Software Issues</a:t>
+              <a:t>Car:</a:t>
             </a:r>
           </a:p>
           <a:p>
             <a:pPr lvl="1"/>
             <a:r>
               <a:rPr lang="en-US" dirty="0" smtClean="0"/>
-              <a:t>Unfamiliarity with development environment</a:t>
-            </a:r>
-          </a:p>
-          <a:p>
-            <a:pPr lvl="2"/>
-            <a:r>
-              <a:rPr lang="en-US" dirty="0" smtClean="0"/>
-              <a:t>Met with the </a:t>
+              <a:t>Dashboard with speedometer, tachometer, indicator light.</a:t>
+            </a:r>
+          </a:p>
+          <a:p>
+            <a:pPr lvl="1"/>
+            <a:r>
+              <a:rPr lang="en-US" dirty="0" smtClean="0"/>
+              <a:t>Real-time graphs of car data on screen</a:t>
+            </a:r>
+          </a:p>
+          <a:p>
+            <a:r>
+              <a:rPr lang="en-US" dirty="0" smtClean="0"/>
+              <a:t>Track:</a:t>
+            </a:r>
+          </a:p>
+          <a:p>
+            <a:pPr lvl="1"/>
+            <a:r>
+              <a:rPr lang="en-US" dirty="0" smtClean="0"/>
+              <a:t>Import </a:t>
             </a:r>
             <a:r>
               <a:rPr lang="en-US" dirty="0" err="1" smtClean="0"/>
-              <a:t>Mathworks</a:t>
-            </a:r>
-            <a:r>
-              <a:rPr lang="en-US" dirty="0" smtClean="0"/>
-              <a:t> specialist teaching assistant recommended by you (client)</a:t>
+              <a:t>wrl</a:t>
+            </a:r>
+            <a:r>
+              <a:rPr lang="en-US" dirty="0" smtClean="0"/>
+              <a:t> model of track to match track data</a:t>
             </a:r>
           </a:p>
           <a:p>
             <a:pPr lvl="1"/>
             <a:r>
               <a:rPr lang="en-US" dirty="0" smtClean="0"/>
-              <a:t>Getting Software</a:t>
-            </a:r>
-          </a:p>
-          <a:p>
-            <a:pPr lvl="2"/>
-            <a:r>
-              <a:rPr lang="en-US" dirty="0" smtClean="0"/>
-              <a:t>Before Tuesday, computer we were working with did not </a:t>
-            </a:r>
-            <a:r>
-              <a:rPr lang="en-US" smtClean="0"/>
-              <a:t>have Simulink</a:t>
-            </a:r>
+              <a:t>Fit </a:t>
+            </a:r>
+            <a:r>
+              <a:rPr lang="en-US" dirty="0" err="1" smtClean="0"/>
+              <a:t>wrl</a:t>
+            </a:r>
+            <a:r>
+              <a:rPr lang="en-US" dirty="0" smtClean="0"/>
+              <a:t> model with track concept (fast mountain road)</a:t>
+            </a:r>
+          </a:p>
+          <a:p>
+            <a:pPr marL="448056" lvl="1" indent="0">
+              <a:buNone/>
+            </a:pPr>
             <a:endParaRPr lang="en-US" dirty="0" smtClean="0"/>
-          </a:p>
-          <a:p>
-            <a:pPr lvl="2"/>
-            <a:r>
-              <a:rPr lang="en-US" dirty="0" smtClean="0"/>
-              <a:t>We are working with a soon-to-expire trial version of the 3D Animation Software</a:t>
-            </a:r>
           </a:p>
         </p:txBody>
       </p:sp>
     </p:spTree>
     <p:extLst>
       <p:ext uri="{BB962C8B-B14F-4D97-AF65-F5344CB8AC3E}">
-        <p14:creationId xmlns:p14="http://schemas.microsoft.com/office/powerpoint/2010/main" val="364521198"/>
+        <p14:creationId xmlns:p14="http://schemas.microsoft.com/office/powerpoint/2010/main" val="3260175609"/>
       </p:ext>
     </p:extLst>
   </p:cSld>
@@ -4106,45 +4152,91 @@
         </p:nvSpPr>
         <p:spPr/>
         <p:txBody>
-          <a:bodyPr/>
-          <a:lstStyle/>
-          <a:p>
-            <a:r>
-              <a:rPr lang="en-US" dirty="0"/>
-              <a:t>Testing</a:t>
+          <a:bodyPr>
+            <a:normAutofit/>
+          </a:bodyPr>
+          <a:lstStyle/>
+          <a:p>
+            <a:r>
+              <a:rPr lang="en-US" dirty="0" smtClean="0"/>
+              <a:t>Software Issues</a:t>
             </a:r>
           </a:p>
           <a:p>
             <a:pPr lvl="1"/>
             <a:r>
-              <a:rPr lang="en-US" dirty="0"/>
-              <a:t>Since our target audience is very experienced with vehicles, finding a comparable </a:t>
-            </a:r>
-            <a:r>
-              <a:rPr lang="en-US" dirty="0" err="1"/>
-              <a:t>userbase</a:t>
-            </a:r>
-            <a:r>
-              <a:rPr lang="en-US" dirty="0"/>
-              <a:t> to test our design with may be difficult</a:t>
-            </a:r>
+              <a:rPr lang="en-US" dirty="0" smtClean="0"/>
+              <a:t>Unfamiliarity with development environment</a:t>
+            </a:r>
+          </a:p>
+          <a:p>
+            <a:pPr lvl="2"/>
+            <a:r>
+              <a:rPr lang="en-US" dirty="0" smtClean="0"/>
+              <a:t>Met with the </a:t>
+            </a:r>
+            <a:r>
+              <a:rPr lang="en-US" dirty="0" err="1" smtClean="0"/>
+              <a:t>Mathworks</a:t>
+            </a:r>
+            <a:r>
+              <a:rPr lang="en-US" dirty="0" smtClean="0"/>
+              <a:t> specialist teaching assistant recommended by </a:t>
+            </a:r>
+            <a:r>
+              <a:rPr lang="en-US" dirty="0" smtClean="0"/>
+              <a:t>you</a:t>
+            </a:r>
+            <a:endParaRPr lang="en-US" dirty="0" smtClean="0"/>
           </a:p>
           <a:p>
             <a:pPr lvl="1"/>
             <a:r>
-              <a:rPr lang="en-US" dirty="0"/>
-              <a:t>Not all the parts needed to test the intervention strategy have been provided</a:t>
-            </a:r>
-          </a:p>
-          <a:p>
-            <a:endParaRPr lang="en-US" dirty="0"/>
+              <a:rPr lang="en-US" dirty="0" smtClean="0"/>
+              <a:t>Getting Software</a:t>
+            </a:r>
+          </a:p>
+          <a:p>
+            <a:pPr lvl="2"/>
+            <a:r>
+              <a:rPr lang="en-US" dirty="0" smtClean="0"/>
+              <a:t>Before Tuesday</a:t>
+            </a:r>
+            <a:r>
+              <a:rPr lang="en-US" dirty="0" smtClean="0"/>
+              <a:t>, computer </a:t>
+            </a:r>
+            <a:r>
+              <a:rPr lang="en-US" dirty="0" smtClean="0"/>
+              <a:t>was not running</a:t>
+            </a:r>
+            <a:r>
+              <a:rPr lang="en-US" dirty="0" smtClean="0"/>
+              <a:t> </a:t>
+            </a:r>
+            <a:r>
+              <a:rPr lang="en-US" dirty="0" smtClean="0"/>
+              <a:t>Simulink</a:t>
+            </a:r>
+          </a:p>
+          <a:p>
+            <a:pPr lvl="2"/>
+            <a:r>
+              <a:rPr lang="en-US" dirty="0" smtClean="0"/>
+              <a:t>We are working with a soon-to-expire trial version of the 3D Animation </a:t>
+            </a:r>
+            <a:r>
+              <a:rPr lang="en-US" dirty="0" smtClean="0"/>
+              <a:t>Software.</a:t>
+            </a:r>
+            <a:endParaRPr lang="en-US" dirty="0" smtClean="0"/>
           </a:p>
         </p:txBody>
       </p:sp>
     </p:spTree>
     <p:extLst>
       <p:ext uri="{BB962C8B-B14F-4D97-AF65-F5344CB8AC3E}">
-        <p14:creationId xmlns:p14="http://schemas.microsoft.com/office/powerpoint/2010/main" val="3983336453"/>
+        <p14:creationId xmlns:p14="http://schemas.microsoft.com/office/powerpoint/2010/main" val="364521198"/>
       </p:ext>
     </p:extLst>
   </p:cSld>
@@ -4188,7 +4280,7 @@
           <a:p>
             <a:r>
               <a:rPr lang="en-US" dirty="0" smtClean="0"/>
-              <a:t>Milestones</a:t>
+              <a:t>Potential Issues</a:t>
             </a:r>
             <a:endParaRPr lang="en-US" dirty="0"/>
           </a:p>
@@ -4207,58 +4299,69 @@
         <p:spPr/>
         <p:txBody>
           <a:bodyPr>
-            <a:normAutofit/>
+            <a:normAutofit lnSpcReduction="10000"/>
           </a:bodyPr>
           <a:lstStyle/>
           <a:p>
             <a:r>
-              <a:rPr lang="en-US" dirty="0" smtClean="0"/>
-              <a:t>Past Milestone: VW Presentation</a:t>
-            </a:r>
-          </a:p>
-          <a:p>
-            <a:r>
-              <a:rPr lang="en-US" dirty="0" smtClean="0"/>
-              <a:t>Future progress is dependent on you (the client) purchasing software</a:t>
-            </a:r>
-          </a:p>
-          <a:p>
-            <a:r>
-              <a:rPr lang="en-US" dirty="0" smtClean="0"/>
-              <a:t>Only deadline is a working simulation by the end of the semester, which needs</a:t>
+              <a:rPr lang="en-US" dirty="0"/>
+              <a:t>Testing</a:t>
             </a:r>
           </a:p>
           <a:p>
             <a:pPr lvl="1"/>
             <a:r>
-              <a:rPr lang="en-US" dirty="0" smtClean="0"/>
-              <a:t>Track and Dashboard 3D Models</a:t>
+              <a:rPr lang="en-US" dirty="0"/>
+              <a:t>Since our target audience is very experienced with vehicles, finding a comparable </a:t>
+            </a:r>
+            <a:r>
+              <a:rPr lang="en-US" dirty="0" smtClean="0"/>
+              <a:t>user-base </a:t>
+            </a:r>
+            <a:r>
+              <a:rPr lang="en-US" dirty="0"/>
+              <a:t>to test our design with may be difficult</a:t>
             </a:r>
           </a:p>
           <a:p>
             <a:pPr lvl="1"/>
             <a:r>
-              <a:rPr lang="en-US" dirty="0" smtClean="0"/>
-              <a:t>Input to vehicle simulation model</a:t>
+              <a:rPr lang="en-US" dirty="0"/>
+              <a:t>Not all the parts needed to test the intervention strategy have been </a:t>
+            </a:r>
+            <a:r>
+              <a:rPr lang="en-US" dirty="0" smtClean="0"/>
+              <a:t>provided</a:t>
             </a:r>
           </a:p>
           <a:p>
             <a:pPr lvl="1"/>
             <a:r>
-              <a:rPr lang="en-US" dirty="0" err="1" smtClean="0"/>
-              <a:t>Realtime</a:t>
-            </a:r>
-            <a:r>
-              <a:rPr lang="en-US" dirty="0" smtClean="0"/>
-              <a:t> view updating to show information from the model</a:t>
-            </a:r>
+              <a:rPr lang="en-US" dirty="0" smtClean="0"/>
+              <a:t>“Faking” intervention strategy for initial user tests</a:t>
+            </a:r>
+          </a:p>
+          <a:p>
+            <a:pPr lvl="1"/>
+            <a:r>
+              <a:rPr lang="en-US" dirty="0" smtClean="0"/>
+              <a:t>Acquiring legal permission to test with subjects outside </a:t>
+            </a:r>
+            <a:r>
+              <a:rPr lang="en-US" smtClean="0"/>
+              <a:t>of project.</a:t>
+            </a:r>
+            <a:endParaRPr lang="en-US" dirty="0"/>
+          </a:p>
+          <a:p>
+            <a:endParaRPr lang="en-US" dirty="0"/>
           </a:p>
         </p:txBody>
       </p:sp>
     </p:spTree>
     <p:extLst>
       <p:ext uri="{BB962C8B-B14F-4D97-AF65-F5344CB8AC3E}">
-        <p14:creationId xmlns:p14="http://schemas.microsoft.com/office/powerpoint/2010/main" val="698063238"/>
+        <p14:creationId xmlns:p14="http://schemas.microsoft.com/office/powerpoint/2010/main" val="3983336453"/>
       </p:ext>
     </p:extLst>
   </p:cSld>
@@ -4302,6 +4405,129 @@
           <a:p>
             <a:r>
               <a:rPr lang="en-US" dirty="0" smtClean="0"/>
+              <a:t>Milestones</a:t>
+            </a:r>
+            <a:endParaRPr lang="en-US" dirty="0"/>
+          </a:p>
+        </p:txBody>
+      </p:sp>
+      <p:sp>
+        <p:nvSpPr>
+          <p:cNvPr id="3" name="Content Placeholder 2"/>
+          <p:cNvSpPr>
+            <a:spLocks noGrp="1"/>
+          </p:cNvSpPr>
+          <p:nvPr>
+            <p:ph idx="1"/>
+          </p:nvPr>
+        </p:nvSpPr>
+        <p:spPr/>
+        <p:txBody>
+          <a:bodyPr>
+            <a:normAutofit lnSpcReduction="10000"/>
+          </a:bodyPr>
+          <a:lstStyle/>
+          <a:p>
+            <a:r>
+              <a:rPr lang="en-US" dirty="0" smtClean="0"/>
+              <a:t>Past Milestone: VW Presentation</a:t>
+            </a:r>
+          </a:p>
+          <a:p>
+            <a:r>
+              <a:rPr lang="en-US" dirty="0" smtClean="0"/>
+              <a:t>Future progress is dependent on </a:t>
+            </a:r>
+            <a:r>
+              <a:rPr lang="en-US" dirty="0" smtClean="0"/>
+              <a:t>availability of software</a:t>
+            </a:r>
+            <a:endParaRPr lang="en-US" dirty="0" smtClean="0"/>
+          </a:p>
+          <a:p>
+            <a:r>
+              <a:rPr lang="en-US" dirty="0" smtClean="0"/>
+              <a:t>Only hard </a:t>
+            </a:r>
+            <a:r>
+              <a:rPr lang="en-US" dirty="0" smtClean="0"/>
+              <a:t>deadline is a working simulation by the end of the semester, which needs</a:t>
+            </a:r>
+          </a:p>
+          <a:p>
+            <a:pPr lvl="1"/>
+            <a:r>
+              <a:rPr lang="en-US" dirty="0" smtClean="0"/>
+              <a:t>Track and Dashboard 3D Models</a:t>
+            </a:r>
+          </a:p>
+          <a:p>
+            <a:pPr lvl="1"/>
+            <a:r>
+              <a:rPr lang="en-US" dirty="0" smtClean="0"/>
+              <a:t>Input to vehicle simulation model</a:t>
+            </a:r>
+          </a:p>
+          <a:p>
+            <a:pPr lvl="1"/>
+            <a:r>
+              <a:rPr lang="en-US" dirty="0" smtClean="0"/>
+              <a:t>Real-time views </a:t>
+            </a:r>
+            <a:r>
+              <a:rPr lang="en-US" dirty="0" smtClean="0"/>
+              <a:t>updating to show information from the model</a:t>
+            </a:r>
+          </a:p>
+        </p:txBody>
+      </p:sp>
+    </p:spTree>
+    <p:extLst>
+      <p:ext uri="{BB962C8B-B14F-4D97-AF65-F5344CB8AC3E}">
+        <p14:creationId xmlns:p14="http://schemas.microsoft.com/office/powerpoint/2010/main" val="698063238"/>
+      </p:ext>
+    </p:extLst>
+  </p:cSld>
+  <p:clrMapOvr>
+    <a:masterClrMapping/>
+  </p:clrMapOvr>
+</p:sld>
+</file>
+
+<file path=ppt/slides/slide8.xml><?xml version="1.0" encoding="utf-8"?>
+<p:sld xmlns:a="http://schemas.openxmlformats.org/drawingml/2006/main" xmlns:r="http://schemas.openxmlformats.org/officeDocument/2006/relationships" xmlns:p="http://schemas.openxmlformats.org/presentationml/2006/main">
+  <p:cSld>
+    <p:spTree>
+      <p:nvGrpSpPr>
+        <p:cNvPr id="1" name=""/>
+        <p:cNvGrpSpPr/>
+        <p:nvPr/>
+      </p:nvGrpSpPr>
+      <p:grpSpPr>
+        <a:xfrm>
+          <a:off x="0" y="0"/>
+          <a:ext cx="0" cy="0"/>
+          <a:chOff x="0" y="0"/>
+          <a:chExt cx="0" cy="0"/>
+        </a:xfrm>
+      </p:grpSpPr>
+      <p:sp>
+        <p:nvSpPr>
+          <p:cNvPr id="2" name="Title 1"/>
+          <p:cNvSpPr>
+            <a:spLocks noGrp="1"/>
+          </p:cNvSpPr>
+          <p:nvPr>
+            <p:ph type="title"/>
+          </p:nvPr>
+        </p:nvSpPr>
+        <p:spPr/>
+        <p:txBody>
+          <a:bodyPr/>
+          <a:lstStyle/>
+          <a:p>
+            <a:r>
+              <a:rPr lang="en-US" dirty="0" smtClean="0"/>
               <a:t>Stretch Goals</a:t>
             </a:r>
             <a:endParaRPr lang="en-US" dirty="0"/>
@@ -4325,8 +4551,20 @@
           <a:p>
             <a:r>
               <a:rPr lang="en-US" dirty="0" smtClean="0"/>
-              <a:t>Force Feedback to Controller</a:t>
-            </a:r>
+              <a:t>Force Feedback to </a:t>
+            </a:r>
+            <a:r>
+              <a:rPr lang="en-US" dirty="0" smtClean="0"/>
+              <a:t>Controller</a:t>
+            </a:r>
+          </a:p>
+          <a:p>
+            <a:pPr lvl="1"/>
+            <a:r>
+              <a:rPr lang="en-US" dirty="0" smtClean="0"/>
+              <a:t>Should be easy to add basic implementation</a:t>
+            </a:r>
+            <a:endParaRPr lang="en-US" dirty="0" smtClean="0"/>
           </a:p>
           <a:p>
             <a:endParaRPr lang="en-US" dirty="0"/>
@@ -4334,7 +4572,20 @@
           <a:p>
             <a:r>
               <a:rPr lang="en-US" dirty="0" smtClean="0"/>
-              <a:t>“Ghost Car” of previous lap</a:t>
+              <a:t>“Ghost Car” of previous </a:t>
+            </a:r>
+            <a:r>
+              <a:rPr lang="en-US" dirty="0" smtClean="0"/>
+              <a:t>lap</a:t>
+            </a:r>
+          </a:p>
+          <a:p>
+            <a:endParaRPr lang="en-US" dirty="0"/>
+          </a:p>
+          <a:p>
+            <a:r>
+              <a:rPr lang="en-US" dirty="0" smtClean="0"/>
+              <a:t>Head-tracking?</a:t>
             </a:r>
             <a:endParaRPr lang="en-US" dirty="0"/>
           </a:p>

</xml_diff>

<commit_message>
Added picture to presentation
</commit_message>
<xml_diff>
--- a/Class Presentation 10-30-2013/Presentation.pptx
+++ b/Class Presentation 10-30-2013/Presentation.pptx
@@ -113,7 +113,7 @@
   </p:defaultTextStyle>
   <p:extLst>
     <p:ext uri="{EFAFB233-063F-42B5-8137-9DF3F51BA10A}">
-      <p15:sldGuideLst xmlns:p15="http://schemas.microsoft.com/office/powerpoint/2012/main">
+      <p15:sldGuideLst xmlns:p15="http://schemas.microsoft.com/office/powerpoint/2012/main" xmlns="">
         <p15:guide id="1" orient="horz" pos="2160">
           <p15:clr>
             <a:srgbClr val="A4A3A4"/>
@@ -514,7 +514,7 @@
           <a:p>
             <a:fld id="{F903CC24-ED18-4E56-B0E0-9964F1347BCD}" type="datetimeFigureOut">
               <a:rPr lang="en-US" smtClean="0"/>
-              <a:t>10/30/2013</a:t>
+              <a:t>10/31/2013</a:t>
             </a:fld>
             <a:endParaRPr lang="en-US"/>
           </a:p>
@@ -679,7 +679,7 @@
           <a:p>
             <a:fld id="{F903CC24-ED18-4E56-B0E0-9964F1347BCD}" type="datetimeFigureOut">
               <a:rPr lang="en-US" smtClean="0"/>
-              <a:t>10/30/2013</a:t>
+              <a:t>10/31/2013</a:t>
             </a:fld>
             <a:endParaRPr lang="en-US"/>
           </a:p>
@@ -854,7 +854,7 @@
           <a:p>
             <a:fld id="{F903CC24-ED18-4E56-B0E0-9964F1347BCD}" type="datetimeFigureOut">
               <a:rPr lang="en-US" smtClean="0"/>
-              <a:t>10/30/2013</a:t>
+              <a:t>10/31/2013</a:t>
             </a:fld>
             <a:endParaRPr lang="en-US"/>
           </a:p>
@@ -1023,7 +1023,7 @@
           <a:p>
             <a:fld id="{F903CC24-ED18-4E56-B0E0-9964F1347BCD}" type="datetimeFigureOut">
               <a:rPr lang="en-US" smtClean="0"/>
-              <a:t>10/30/2013</a:t>
+              <a:t>10/31/2013</a:t>
             </a:fld>
             <a:endParaRPr lang="en-US"/>
           </a:p>
@@ -1478,7 +1478,7 @@
           <a:p>
             <a:fld id="{F903CC24-ED18-4E56-B0E0-9964F1347BCD}" type="datetimeFigureOut">
               <a:rPr lang="en-US" smtClean="0"/>
-              <a:t>10/30/2013</a:t>
+              <a:t>10/31/2013</a:t>
             </a:fld>
             <a:endParaRPr lang="en-US"/>
           </a:p>
@@ -1742,7 +1742,7 @@
           <a:p>
             <a:fld id="{F903CC24-ED18-4E56-B0E0-9964F1347BCD}" type="datetimeFigureOut">
               <a:rPr lang="en-US" smtClean="0"/>
-              <a:t>10/30/2013</a:t>
+              <a:t>10/31/2013</a:t>
             </a:fld>
             <a:endParaRPr lang="en-US"/>
           </a:p>
@@ -2116,7 +2116,7 @@
           <a:p>
             <a:fld id="{F903CC24-ED18-4E56-B0E0-9964F1347BCD}" type="datetimeFigureOut">
               <a:rPr lang="en-US" smtClean="0"/>
-              <a:t>10/30/2013</a:t>
+              <a:t>10/31/2013</a:t>
             </a:fld>
             <a:endParaRPr lang="en-US"/>
           </a:p>
@@ -2238,7 +2238,7 @@
           <a:p>
             <a:fld id="{F903CC24-ED18-4E56-B0E0-9964F1347BCD}" type="datetimeFigureOut">
               <a:rPr lang="en-US" smtClean="0"/>
-              <a:t>10/30/2013</a:t>
+              <a:t>10/31/2013</a:t>
             </a:fld>
             <a:endParaRPr lang="en-US"/>
           </a:p>
@@ -2328,7 +2328,7 @@
           <a:p>
             <a:fld id="{F903CC24-ED18-4E56-B0E0-9964F1347BCD}" type="datetimeFigureOut">
               <a:rPr lang="en-US" smtClean="0"/>
-              <a:t>10/30/2013</a:t>
+              <a:t>10/31/2013</a:t>
             </a:fld>
             <a:endParaRPr lang="en-US"/>
           </a:p>
@@ -2577,7 +2577,7 @@
           <a:p>
             <a:fld id="{F903CC24-ED18-4E56-B0E0-9964F1347BCD}" type="datetimeFigureOut">
               <a:rPr lang="en-US" smtClean="0"/>
-              <a:t>10/30/2013</a:t>
+              <a:t>10/31/2013</a:t>
             </a:fld>
             <a:endParaRPr lang="en-US"/>
           </a:p>
@@ -2836,7 +2836,7 @@
           <a:p>
             <a:fld id="{F903CC24-ED18-4E56-B0E0-9964F1347BCD}" type="datetimeFigureOut">
               <a:rPr lang="en-US" smtClean="0"/>
-              <a:t>10/30/2013</a:t>
+              <a:t>10/31/2013</a:t>
             </a:fld>
             <a:endParaRPr lang="en-US"/>
           </a:p>
@@ -3240,7 +3240,7 @@
           <a:p>
             <a:fld id="{F903CC24-ED18-4E56-B0E0-9964F1347BCD}" type="datetimeFigureOut">
               <a:rPr lang="en-US" smtClean="0"/>
-              <a:t>10/30/2013</a:t>
+              <a:t>10/31/2013</a:t>
             </a:fld>
             <a:endParaRPr lang="en-US"/>
           </a:p>
@@ -3830,8 +3830,37 @@
         </p:blipFill>
         <p:spPr>
           <a:xfrm rot="16200000">
-            <a:off x="3128206" y="3437708"/>
+            <a:off x="1125234" y="3424993"/>
             <a:ext cx="2658991" cy="3581403"/>
+          </a:xfrm>
+          <a:prstGeom prst="rect">
+            <a:avLst/>
+          </a:prstGeom>
+        </p:spPr>
+      </p:pic>
+      <p:pic>
+        <p:nvPicPr>
+          <p:cNvPr id="4" name="Picture 3"/>
+          <p:cNvPicPr>
+            <a:picLocks noChangeAspect="1"/>
+          </p:cNvPicPr>
+          <p:nvPr/>
+        </p:nvPicPr>
+        <p:blipFill rotWithShape="1">
+          <a:blip r:embed="rId3" cstate="print">
+            <a:extLst>
+              <a:ext uri="{28A0092B-C50C-407E-A947-70E740481C1C}">
+                <a14:useLocalDpi xmlns:a14="http://schemas.microsoft.com/office/drawing/2010/main" val="0"/>
+              </a:ext>
+            </a:extLst>
+          </a:blip>
+          <a:srcRect l="28142" t="25403" r="35929" b="30705"/>
+          <a:stretch/>
+        </p:blipFill>
+        <p:spPr>
+          <a:xfrm>
+            <a:off x="4891491" y="3886198"/>
+            <a:ext cx="3865527" cy="2658992"/>
           </a:xfrm>
           <a:prstGeom prst="rect">
             <a:avLst/>
@@ -3904,7 +3933,7 @@
         <p:spPr/>
         <p:txBody>
           <a:bodyPr>
-            <a:normAutofit/>
+            <a:normAutofit lnSpcReduction="10000"/>
           </a:bodyPr>
           <a:lstStyle/>
           <a:p>
@@ -3912,12 +3941,19 @@
               <a:rPr lang="en-US" dirty="0" smtClean="0"/>
               <a:t>Obtain a license for Simulink 3D </a:t>
             </a:r>
-            <a:endParaRPr lang="en-US" dirty="0" smtClean="0"/>
-          </a:p>
-          <a:p>
             <a:r>
               <a:rPr lang="en-US" dirty="0" smtClean="0"/>
-              <a:t>Animation Work on 3D car/track design</a:t>
+              <a:t>Animation </a:t>
+            </a:r>
+          </a:p>
+          <a:p>
+            <a:r>
+              <a:rPr lang="en-US" dirty="0" smtClean="0"/>
+              <a:t>Work </a:t>
+            </a:r>
+            <a:r>
+              <a:rPr lang="en-US" dirty="0" smtClean="0"/>
+              <a:t>on 3D car/track design</a:t>
             </a:r>
           </a:p>
           <a:p>
@@ -3925,27 +3961,17 @@
               <a:rPr lang="en-US" dirty="0" smtClean="0"/>
               <a:t>Map Steering-Wheel input (Simulink Joystick input)</a:t>
             </a:r>
-            <a:endParaRPr lang="en-US" dirty="0" smtClean="0"/>
           </a:p>
           <a:p>
             <a:r>
               <a:rPr lang="en-US" dirty="0" smtClean="0"/>
               <a:t>Create real-time data visualizations (graphs)</a:t>
             </a:r>
-            <a:endParaRPr lang="en-US" dirty="0" smtClean="0"/>
           </a:p>
           <a:p>
             <a:r>
               <a:rPr lang="en-US" dirty="0" smtClean="0"/>
-              <a:t>Map track position data to </a:t>
-            </a:r>
-            <a:r>
-              <a:rPr lang="en-US" dirty="0" smtClean="0"/>
-              <a:t>MATLAB-readable </a:t>
-            </a:r>
-            <a:r>
-              <a:rPr lang="en-US" dirty="0" smtClean="0"/>
-              <a:t>dataset</a:t>
+              <a:t>Map track position data to MATLAB-readable dataset</a:t>
             </a:r>
           </a:p>
         </p:txBody>
@@ -3997,11 +4023,7 @@
           <a:p>
             <a:r>
               <a:rPr lang="en-US" dirty="0" smtClean="0"/>
-              <a:t>Design </a:t>
-            </a:r>
-            <a:r>
-              <a:rPr lang="en-US" dirty="0" smtClean="0"/>
-              <a:t>Tasks</a:t>
+              <a:t>Design Tasks</a:t>
             </a:r>
             <a:endParaRPr lang="en-US" dirty="0"/>
           </a:p>
@@ -4177,17 +4199,16 @@
             </a:r>
             <a:r>
               <a:rPr lang="en-US" dirty="0" err="1" smtClean="0"/>
-              <a:t>Mathworks</a:t>
+              <a:t>MathWorks</a:t>
             </a:r>
             <a:r>
               <a:rPr lang="en-US" dirty="0" smtClean="0"/>
-              <a:t> specialist teaching assistant recommended by </a:t>
+              <a:t> </a:t>
             </a:r>
             <a:r>
               <a:rPr lang="en-US" dirty="0" smtClean="0"/>
-              <a:t>you</a:t>
-            </a:r>
-            <a:endParaRPr lang="en-US" dirty="0" smtClean="0"/>
+              <a:t>specialist teaching assistant recommended by you</a:t>
+            </a:r>
           </a:p>
           <a:p>
             <a:pPr lvl="1"/>
@@ -4200,36 +4221,15 @@
             <a:pPr lvl="2"/>
             <a:r>
               <a:rPr lang="en-US" dirty="0" smtClean="0"/>
-              <a:t>Before Tuesday</a:t>
-            </a:r>
+              <a:t>Before Tuesday, computer was not running Simulink</a:t>
+            </a:r>
+          </a:p>
+          <a:p>
+            <a:pPr lvl="2"/>
             <a:r>
               <a:rPr lang="en-US" dirty="0" smtClean="0"/>
-              <a:t>, computer </a:t>
-            </a:r>
-            <a:r>
-              <a:rPr lang="en-US" dirty="0" smtClean="0"/>
-              <a:t>was not running</a:t>
-            </a:r>
-            <a:r>
-              <a:rPr lang="en-US" dirty="0" smtClean="0"/>
-              <a:t> </a:t>
-            </a:r>
-            <a:r>
-              <a:rPr lang="en-US" dirty="0" smtClean="0"/>
-              <a:t>Simulink</a:t>
-            </a:r>
-          </a:p>
-          <a:p>
-            <a:pPr lvl="2"/>
-            <a:r>
-              <a:rPr lang="en-US" dirty="0" smtClean="0"/>
-              <a:t>We are working with a soon-to-expire trial version of the 3D Animation </a:t>
-            </a:r>
-            <a:r>
-              <a:rPr lang="en-US" dirty="0" smtClean="0"/>
-              <a:t>Software.</a:t>
-            </a:r>
-            <a:endParaRPr lang="en-US" dirty="0" smtClean="0"/>
+              <a:t>We are working with a soon-to-expire trial version of the 3D Animation Software.</a:t>
+            </a:r>
           </a:p>
         </p:txBody>
       </p:sp>
@@ -4436,22 +4436,13 @@
           <a:p>
             <a:r>
               <a:rPr lang="en-US" dirty="0" smtClean="0"/>
-              <a:t>Future progress is dependent on </a:t>
-            </a:r>
+              <a:t>Future progress is dependent on availability of software</a:t>
+            </a:r>
+          </a:p>
+          <a:p>
             <a:r>
               <a:rPr lang="en-US" dirty="0" smtClean="0"/>
-              <a:t>availability of software</a:t>
-            </a:r>
-            <a:endParaRPr lang="en-US" dirty="0" smtClean="0"/>
-          </a:p>
-          <a:p>
-            <a:r>
-              <a:rPr lang="en-US" dirty="0" smtClean="0"/>
-              <a:t>Only hard </a:t>
-            </a:r>
-            <a:r>
-              <a:rPr lang="en-US" dirty="0" smtClean="0"/>
-              <a:t>deadline is a working simulation by the end of the semester, which needs</a:t>
+              <a:t>Only hard deadline is a working simulation by the end of the semester, which needs</a:t>
             </a:r>
           </a:p>
           <a:p>
@@ -4472,11 +4463,7 @@
             <a:pPr lvl="1"/>
             <a:r>
               <a:rPr lang="en-US" dirty="0" smtClean="0"/>
-              <a:t>Real-time views </a:t>
-            </a:r>
-            <a:r>
-              <a:rPr lang="en-US" dirty="0" smtClean="0"/>
-              <a:t>updating to show information from the model</a:t>
+              <a:t>Real-time views updating to show information from the model</a:t>
             </a:r>
           </a:p>
         </p:txBody>
@@ -4551,11 +4538,7 @@
           <a:p>
             <a:r>
               <a:rPr lang="en-US" dirty="0" smtClean="0"/>
-              <a:t>Force Feedback to </a:t>
-            </a:r>
-            <a:r>
-              <a:rPr lang="en-US" dirty="0" smtClean="0"/>
-              <a:t>Controller</a:t>
+              <a:t>Force Feedback to Controller</a:t>
             </a:r>
           </a:p>
           <a:p>
@@ -4564,7 +4547,6 @@
               <a:rPr lang="en-US" dirty="0" smtClean="0"/>
               <a:t>Should be easy to add basic implementation</a:t>
             </a:r>
-            <a:endParaRPr lang="en-US" dirty="0" smtClean="0"/>
           </a:p>
           <a:p>
             <a:endParaRPr lang="en-US" dirty="0"/>
@@ -4572,11 +4554,7 @@
           <a:p>
             <a:r>
               <a:rPr lang="en-US" dirty="0" smtClean="0"/>
-              <a:t>“Ghost Car” of previous </a:t>
-            </a:r>
-            <a:r>
-              <a:rPr lang="en-US" dirty="0" smtClean="0"/>
-              <a:t>lap</a:t>
+              <a:t>“Ghost Car” of previous lap</a:t>
             </a:r>
           </a:p>
           <a:p>

</xml_diff>